<commit_message>
Merge /dev into /hmi/dev
We have two dev directories with almost the same content. This change merges the /dev directory into /hmi/dev keeping the newer version of things
</commit_message>
<xml_diff>
--- a/hmi/dev/ui/eu/pics/NSPanel - EU.pptx
+++ b/hmi/dev/ui/eu/pics/NSPanel - EU.pptx
@@ -10,6 +10,8 @@
     <p:sldId id="259" r:id="rId4"/>
     <p:sldId id="256" r:id="rId5"/>
     <p:sldId id="257" r:id="rId6"/>
+    <p:sldId id="262" r:id="rId7"/>
+    <p:sldId id="263" r:id="rId8"/>
   </p:sldIdLst>
   <p:sldSz cx="4572000" cy="3048000"/>
   <p:notesSz cx="6858000" cy="9144000"/>
@@ -119,13 +121,225 @@
 <file path=ppt/revisionInfo.xml><?xml version="1.0" encoding="utf-8"?>
 <p1510:revInfo xmlns:a="http://schemas.openxmlformats.org/drawingml/2006/main" xmlns:r="http://schemas.openxmlformats.org/officeDocument/2006/relationships" xmlns:p1510="http://schemas.microsoft.com/office/powerpoint/2015/10/main">
   <p1510:revLst>
-    <p1510:client id="{C3835F5B-ACBF-4DC6-BB0A-50D53BBEDC6B}" v="3" dt="2024-02-01T09:40:19.323"/>
+    <p1510:client id="{89AC5C0C-894A-47A0-8FCB-A543991BE815}" v="6" dt="2024-07-09T07:39:41.639"/>
   </p1510:revLst>
 </p1510:revInfo>
 </file>
 
 <file path=ppt/changesInfos/changesInfo1.xml><?xml version="1.0" encoding="utf-8"?>
 <pc:chgInfo xmlns:a="http://schemas.openxmlformats.org/drawingml/2006/main" xmlns:r="http://schemas.openxmlformats.org/officeDocument/2006/relationships" xmlns:ac="http://schemas.microsoft.com/office/drawing/2013/main/command" xmlns:pc="http://schemas.microsoft.com/office/powerpoint/2013/main/command">
+  <pc:docChgLst>
+    <pc:chgData name="Edward Firmo" userId="a172d909a3b48d48" providerId="LiveId" clId="{89AC5C0C-894A-47A0-8FCB-A543991BE815}"/>
+    <pc:docChg chg="undo custSel addSld delSld modSld">
+      <pc:chgData name="Edward Firmo" userId="a172d909a3b48d48" providerId="LiveId" clId="{89AC5C0C-894A-47A0-8FCB-A543991BE815}" dt="2024-07-12T08:52:03.254" v="297" actId="207"/>
+      <pc:docMkLst>
+        <pc:docMk/>
+      </pc:docMkLst>
+      <pc:sldChg chg="modSp mod">
+        <pc:chgData name="Edward Firmo" userId="a172d909a3b48d48" providerId="LiveId" clId="{89AC5C0C-894A-47A0-8FCB-A543991BE815}" dt="2024-07-12T08:50:34.281" v="295" actId="207"/>
+        <pc:sldMkLst>
+          <pc:docMk/>
+          <pc:sldMk cId="2478264824" sldId="256"/>
+        </pc:sldMkLst>
+        <pc:spChg chg="mod">
+          <ac:chgData name="Edward Firmo" userId="a172d909a3b48d48" providerId="LiveId" clId="{89AC5C0C-894A-47A0-8FCB-A543991BE815}" dt="2024-07-12T08:50:34.281" v="295" actId="207"/>
+          <ac:spMkLst>
+            <pc:docMk/>
+            <pc:sldMk cId="2478264824" sldId="256"/>
+            <ac:spMk id="8" creationId="{3AA2A801-457E-87BC-3B72-3221D54F8E42}"/>
+          </ac:spMkLst>
+        </pc:spChg>
+        <pc:spChg chg="mod">
+          <ac:chgData name="Edward Firmo" userId="a172d909a3b48d48" providerId="LiveId" clId="{89AC5C0C-894A-47A0-8FCB-A543991BE815}" dt="2024-07-12T08:50:34.281" v="295" actId="207"/>
+          <ac:spMkLst>
+            <pc:docMk/>
+            <pc:sldMk cId="2478264824" sldId="256"/>
+            <ac:spMk id="9" creationId="{24DB2494-D161-11FB-FEF7-ED748EE3D1BC}"/>
+          </ac:spMkLst>
+        </pc:spChg>
+        <pc:spChg chg="mod">
+          <ac:chgData name="Edward Firmo" userId="a172d909a3b48d48" providerId="LiveId" clId="{89AC5C0C-894A-47A0-8FCB-A543991BE815}" dt="2024-07-12T08:50:34.281" v="295" actId="207"/>
+          <ac:spMkLst>
+            <pc:docMk/>
+            <pc:sldMk cId="2478264824" sldId="256"/>
+            <ac:spMk id="10" creationId="{1CCC58E7-7282-FD56-E454-66C5E99F52F2}"/>
+          </ac:spMkLst>
+        </pc:spChg>
+        <pc:spChg chg="mod">
+          <ac:chgData name="Edward Firmo" userId="a172d909a3b48d48" providerId="LiveId" clId="{89AC5C0C-894A-47A0-8FCB-A543991BE815}" dt="2024-07-12T08:50:34.281" v="295" actId="207"/>
+          <ac:spMkLst>
+            <pc:docMk/>
+            <pc:sldMk cId="2478264824" sldId="256"/>
+            <ac:spMk id="11" creationId="{47405F33-FD0F-47B3-2587-54459381EDD9}"/>
+          </ac:spMkLst>
+        </pc:spChg>
+        <pc:spChg chg="mod">
+          <ac:chgData name="Edward Firmo" userId="a172d909a3b48d48" providerId="LiveId" clId="{89AC5C0C-894A-47A0-8FCB-A543991BE815}" dt="2024-07-12T08:50:34.281" v="295" actId="207"/>
+          <ac:spMkLst>
+            <pc:docMk/>
+            <pc:sldMk cId="2478264824" sldId="256"/>
+            <ac:spMk id="12" creationId="{AAFC7E33-D819-6F1F-C512-78769358B8F7}"/>
+          </ac:spMkLst>
+        </pc:spChg>
+        <pc:spChg chg="mod">
+          <ac:chgData name="Edward Firmo" userId="a172d909a3b48d48" providerId="LiveId" clId="{89AC5C0C-894A-47A0-8FCB-A543991BE815}" dt="2024-07-12T08:50:34.281" v="295" actId="207"/>
+          <ac:spMkLst>
+            <pc:docMk/>
+            <pc:sldMk cId="2478264824" sldId="256"/>
+            <ac:spMk id="13" creationId="{1BEB1FCC-0605-CCB8-FCC2-F243BE81FE92}"/>
+          </ac:spMkLst>
+        </pc:spChg>
+        <pc:spChg chg="mod">
+          <ac:chgData name="Edward Firmo" userId="a172d909a3b48d48" providerId="LiveId" clId="{89AC5C0C-894A-47A0-8FCB-A543991BE815}" dt="2024-07-12T08:50:34.281" v="295" actId="207"/>
+          <ac:spMkLst>
+            <pc:docMk/>
+            <pc:sldMk cId="2478264824" sldId="256"/>
+            <ac:spMk id="14" creationId="{AD39C582-2955-B913-1E03-89D3A3C1A1C7}"/>
+          </ac:spMkLst>
+        </pc:spChg>
+        <pc:spChg chg="mod">
+          <ac:chgData name="Edward Firmo" userId="a172d909a3b48d48" providerId="LiveId" clId="{89AC5C0C-894A-47A0-8FCB-A543991BE815}" dt="2024-07-12T08:50:34.281" v="295" actId="207"/>
+          <ac:spMkLst>
+            <pc:docMk/>
+            <pc:sldMk cId="2478264824" sldId="256"/>
+            <ac:spMk id="15" creationId="{7CF83176-637F-0E98-B9D6-2E62DA2474F1}"/>
+          </ac:spMkLst>
+        </pc:spChg>
+      </pc:sldChg>
+      <pc:sldChg chg="modSp mod">
+        <pc:chgData name="Edward Firmo" userId="a172d909a3b48d48" providerId="LiveId" clId="{89AC5C0C-894A-47A0-8FCB-A543991BE815}" dt="2024-07-12T08:52:03.254" v="297" actId="207"/>
+        <pc:sldMkLst>
+          <pc:docMk/>
+          <pc:sldMk cId="481644452" sldId="257"/>
+        </pc:sldMkLst>
+        <pc:spChg chg="mod">
+          <ac:chgData name="Edward Firmo" userId="a172d909a3b48d48" providerId="LiveId" clId="{89AC5C0C-894A-47A0-8FCB-A543991BE815}" dt="2024-07-12T08:52:03.254" v="297" actId="207"/>
+          <ac:spMkLst>
+            <pc:docMk/>
+            <pc:sldMk cId="481644452" sldId="257"/>
+            <ac:spMk id="8" creationId="{3AA2A801-457E-87BC-3B72-3221D54F8E42}"/>
+          </ac:spMkLst>
+        </pc:spChg>
+        <pc:spChg chg="mod">
+          <ac:chgData name="Edward Firmo" userId="a172d909a3b48d48" providerId="LiveId" clId="{89AC5C0C-894A-47A0-8FCB-A543991BE815}" dt="2024-07-12T08:52:03.254" v="297" actId="207"/>
+          <ac:spMkLst>
+            <pc:docMk/>
+            <pc:sldMk cId="481644452" sldId="257"/>
+            <ac:spMk id="9" creationId="{24DB2494-D161-11FB-FEF7-ED748EE3D1BC}"/>
+          </ac:spMkLst>
+        </pc:spChg>
+        <pc:spChg chg="mod">
+          <ac:chgData name="Edward Firmo" userId="a172d909a3b48d48" providerId="LiveId" clId="{89AC5C0C-894A-47A0-8FCB-A543991BE815}" dt="2024-07-12T08:52:03.254" v="297" actId="207"/>
+          <ac:spMkLst>
+            <pc:docMk/>
+            <pc:sldMk cId="481644452" sldId="257"/>
+            <ac:spMk id="10" creationId="{1CCC58E7-7282-FD56-E454-66C5E99F52F2}"/>
+          </ac:spMkLst>
+        </pc:spChg>
+        <pc:spChg chg="mod">
+          <ac:chgData name="Edward Firmo" userId="a172d909a3b48d48" providerId="LiveId" clId="{89AC5C0C-894A-47A0-8FCB-A543991BE815}" dt="2024-07-12T08:52:03.254" v="297" actId="207"/>
+          <ac:spMkLst>
+            <pc:docMk/>
+            <pc:sldMk cId="481644452" sldId="257"/>
+            <ac:spMk id="11" creationId="{47405F33-FD0F-47B3-2587-54459381EDD9}"/>
+          </ac:spMkLst>
+        </pc:spChg>
+        <pc:spChg chg="mod">
+          <ac:chgData name="Edward Firmo" userId="a172d909a3b48d48" providerId="LiveId" clId="{89AC5C0C-894A-47A0-8FCB-A543991BE815}" dt="2024-07-12T08:52:03.254" v="297" actId="207"/>
+          <ac:spMkLst>
+            <pc:docMk/>
+            <pc:sldMk cId="481644452" sldId="257"/>
+            <ac:spMk id="12" creationId="{AAFC7E33-D819-6F1F-C512-78769358B8F7}"/>
+          </ac:spMkLst>
+        </pc:spChg>
+        <pc:spChg chg="mod">
+          <ac:chgData name="Edward Firmo" userId="a172d909a3b48d48" providerId="LiveId" clId="{89AC5C0C-894A-47A0-8FCB-A543991BE815}" dt="2024-07-12T08:52:03.254" v="297" actId="207"/>
+          <ac:spMkLst>
+            <pc:docMk/>
+            <pc:sldMk cId="481644452" sldId="257"/>
+            <ac:spMk id="13" creationId="{1BEB1FCC-0605-CCB8-FCC2-F243BE81FE92}"/>
+          </ac:spMkLst>
+        </pc:spChg>
+        <pc:spChg chg="mod">
+          <ac:chgData name="Edward Firmo" userId="a172d909a3b48d48" providerId="LiveId" clId="{89AC5C0C-894A-47A0-8FCB-A543991BE815}" dt="2024-07-12T08:52:03.254" v="297" actId="207"/>
+          <ac:spMkLst>
+            <pc:docMk/>
+            <pc:sldMk cId="481644452" sldId="257"/>
+            <ac:spMk id="14" creationId="{AD39C582-2955-B913-1E03-89D3A3C1A1C7}"/>
+          </ac:spMkLst>
+        </pc:spChg>
+        <pc:spChg chg="mod">
+          <ac:chgData name="Edward Firmo" userId="a172d909a3b48d48" providerId="LiveId" clId="{89AC5C0C-894A-47A0-8FCB-A543991BE815}" dt="2024-07-12T08:52:03.254" v="297" actId="207"/>
+          <ac:spMkLst>
+            <pc:docMk/>
+            <pc:sldMk cId="481644452" sldId="257"/>
+            <ac:spMk id="15" creationId="{7CF83176-637F-0E98-B9D6-2E62DA2474F1}"/>
+          </ac:spMkLst>
+        </pc:spChg>
+      </pc:sldChg>
+      <pc:sldChg chg="addSp modSp new mod">
+        <pc:chgData name="Edward Firmo" userId="a172d909a3b48d48" providerId="LiveId" clId="{89AC5C0C-894A-47A0-8FCB-A543991BE815}" dt="2024-07-09T07:26:47.606" v="3" actId="962"/>
+        <pc:sldMkLst>
+          <pc:docMk/>
+          <pc:sldMk cId="2283762670" sldId="262"/>
+        </pc:sldMkLst>
+        <pc:picChg chg="add mod">
+          <ac:chgData name="Edward Firmo" userId="a172d909a3b48d48" providerId="LiveId" clId="{89AC5C0C-894A-47A0-8FCB-A543991BE815}" dt="2024-07-09T07:26:47.606" v="3" actId="962"/>
+          <ac:picMkLst>
+            <pc:docMk/>
+            <pc:sldMk cId="2283762670" sldId="262"/>
+            <ac:picMk id="3" creationId="{E312AA82-1F8D-C027-4D29-5B552B800E69}"/>
+          </ac:picMkLst>
+        </pc:picChg>
+      </pc:sldChg>
+      <pc:sldChg chg="addSp delSp modSp new mod">
+        <pc:chgData name="Edward Firmo" userId="a172d909a3b48d48" providerId="LiveId" clId="{89AC5C0C-894A-47A0-8FCB-A543991BE815}" dt="2024-07-09T07:42:20.252" v="196" actId="1076"/>
+        <pc:sldMkLst>
+          <pc:docMk/>
+          <pc:sldMk cId="1111272298" sldId="263"/>
+        </pc:sldMkLst>
+        <pc:spChg chg="add mod">
+          <ac:chgData name="Edward Firmo" userId="a172d909a3b48d48" providerId="LiveId" clId="{89AC5C0C-894A-47A0-8FCB-A543991BE815}" dt="2024-07-09T07:41:32.213" v="177" actId="5793"/>
+          <ac:spMkLst>
+            <pc:docMk/>
+            <pc:sldMk cId="1111272298" sldId="263"/>
+            <ac:spMk id="8" creationId="{1AB8D876-44F2-706C-70B9-1FC96772E454}"/>
+          </ac:spMkLst>
+        </pc:spChg>
+        <pc:picChg chg="add del mod">
+          <ac:chgData name="Edward Firmo" userId="a172d909a3b48d48" providerId="LiveId" clId="{89AC5C0C-894A-47A0-8FCB-A543991BE815}" dt="2024-07-09T07:34:36.126" v="16" actId="478"/>
+          <ac:picMkLst>
+            <pc:docMk/>
+            <pc:sldMk cId="1111272298" sldId="263"/>
+            <ac:picMk id="3" creationId="{66E9F0CA-5CD4-0922-DD2F-3998049CD3E8}"/>
+          </ac:picMkLst>
+        </pc:picChg>
+        <pc:picChg chg="add mod">
+          <ac:chgData name="Edward Firmo" userId="a172d909a3b48d48" providerId="LiveId" clId="{89AC5C0C-894A-47A0-8FCB-A543991BE815}" dt="2024-07-09T07:38:54.425" v="81" actId="1076"/>
+          <ac:picMkLst>
+            <pc:docMk/>
+            <pc:sldMk cId="1111272298" sldId="263"/>
+            <ac:picMk id="5" creationId="{0FE4C44D-F553-7411-C18E-ADB7E1F2F360}"/>
+          </ac:picMkLst>
+        </pc:picChg>
+        <pc:picChg chg="add mod">
+          <ac:chgData name="Edward Firmo" userId="a172d909a3b48d48" providerId="LiveId" clId="{89AC5C0C-894A-47A0-8FCB-A543991BE815}" dt="2024-07-09T07:42:20.252" v="196" actId="1076"/>
+          <ac:picMkLst>
+            <pc:docMk/>
+            <pc:sldMk cId="1111272298" sldId="263"/>
+            <ac:picMk id="7" creationId="{AF95D14B-CD36-DE92-453B-928DD64988E7}"/>
+          </ac:picMkLst>
+        </pc:picChg>
+      </pc:sldChg>
+      <pc:sldChg chg="new del">
+        <pc:chgData name="Edward Firmo" userId="a172d909a3b48d48" providerId="LiveId" clId="{89AC5C0C-894A-47A0-8FCB-A543991BE815}" dt="2024-07-09T07:35:07.796" v="19" actId="2696"/>
+        <pc:sldMkLst>
+          <pc:docMk/>
+          <pc:sldMk cId="1497418799" sldId="264"/>
+        </pc:sldMkLst>
+      </pc:sldChg>
+    </pc:docChg>
+  </pc:docChgLst>
   <pc:docChgLst>
     <pc:chgData name="Edward Firmo" userId="a172d909a3b48d48" providerId="LiveId" clId="{C3835F5B-ACBF-4DC6-BB0A-50D53BBEDC6B}"/>
     <pc:docChg chg="undo custSel addSld delSld modSld">
@@ -440,7 +654,7 @@
           <a:p>
             <a:fld id="{024B8AE9-66EA-4D6A-A8A7-9C9BEADD6B50}" type="datetimeFigureOut">
               <a:rPr lang="en-SE" smtClean="0"/>
-              <a:t>2024-02-01</a:t>
+              <a:t>2024-07-12</a:t>
             </a:fld>
             <a:endParaRPr lang="en-SE"/>
           </a:p>
@@ -610,7 +824,7 @@
           <a:p>
             <a:fld id="{024B8AE9-66EA-4D6A-A8A7-9C9BEADD6B50}" type="datetimeFigureOut">
               <a:rPr lang="en-SE" smtClean="0"/>
-              <a:t>2024-02-01</a:t>
+              <a:t>2024-07-12</a:t>
             </a:fld>
             <a:endParaRPr lang="en-SE"/>
           </a:p>
@@ -790,7 +1004,7 @@
           <a:p>
             <a:fld id="{024B8AE9-66EA-4D6A-A8A7-9C9BEADD6B50}" type="datetimeFigureOut">
               <a:rPr lang="en-SE" smtClean="0"/>
-              <a:t>2024-02-01</a:t>
+              <a:t>2024-07-12</a:t>
             </a:fld>
             <a:endParaRPr lang="en-SE"/>
           </a:p>
@@ -960,7 +1174,7 @@
           <a:p>
             <a:fld id="{024B8AE9-66EA-4D6A-A8A7-9C9BEADD6B50}" type="datetimeFigureOut">
               <a:rPr lang="en-SE" smtClean="0"/>
-              <a:t>2024-02-01</a:t>
+              <a:t>2024-07-12</a:t>
             </a:fld>
             <a:endParaRPr lang="en-SE"/>
           </a:p>
@@ -1204,7 +1418,7 @@
           <a:p>
             <a:fld id="{024B8AE9-66EA-4D6A-A8A7-9C9BEADD6B50}" type="datetimeFigureOut">
               <a:rPr lang="en-SE" smtClean="0"/>
-              <a:t>2024-02-01</a:t>
+              <a:t>2024-07-12</a:t>
             </a:fld>
             <a:endParaRPr lang="en-SE"/>
           </a:p>
@@ -1436,7 +1650,7 @@
           <a:p>
             <a:fld id="{024B8AE9-66EA-4D6A-A8A7-9C9BEADD6B50}" type="datetimeFigureOut">
               <a:rPr lang="en-SE" smtClean="0"/>
-              <a:t>2024-02-01</a:t>
+              <a:t>2024-07-12</a:t>
             </a:fld>
             <a:endParaRPr lang="en-SE"/>
           </a:p>
@@ -1803,7 +2017,7 @@
           <a:p>
             <a:fld id="{024B8AE9-66EA-4D6A-A8A7-9C9BEADD6B50}" type="datetimeFigureOut">
               <a:rPr lang="en-SE" smtClean="0"/>
-              <a:t>2024-02-01</a:t>
+              <a:t>2024-07-12</a:t>
             </a:fld>
             <a:endParaRPr lang="en-SE"/>
           </a:p>
@@ -1921,7 +2135,7 @@
           <a:p>
             <a:fld id="{024B8AE9-66EA-4D6A-A8A7-9C9BEADD6B50}" type="datetimeFigureOut">
               <a:rPr lang="en-SE" smtClean="0"/>
-              <a:t>2024-02-01</a:t>
+              <a:t>2024-07-12</a:t>
             </a:fld>
             <a:endParaRPr lang="en-SE"/>
           </a:p>
@@ -2016,7 +2230,7 @@
           <a:p>
             <a:fld id="{024B8AE9-66EA-4D6A-A8A7-9C9BEADD6B50}" type="datetimeFigureOut">
               <a:rPr lang="en-SE" smtClean="0"/>
-              <a:t>2024-02-01</a:t>
+              <a:t>2024-07-12</a:t>
             </a:fld>
             <a:endParaRPr lang="en-SE"/>
           </a:p>
@@ -2293,7 +2507,7 @@
           <a:p>
             <a:fld id="{024B8AE9-66EA-4D6A-A8A7-9C9BEADD6B50}" type="datetimeFigureOut">
               <a:rPr lang="en-SE" smtClean="0"/>
-              <a:t>2024-02-01</a:t>
+              <a:t>2024-07-12</a:t>
             </a:fld>
             <a:endParaRPr lang="en-SE"/>
           </a:p>
@@ -2550,7 +2764,7 @@
           <a:p>
             <a:fld id="{024B8AE9-66EA-4D6A-A8A7-9C9BEADD6B50}" type="datetimeFigureOut">
               <a:rPr lang="en-SE" smtClean="0"/>
-              <a:t>2024-02-01</a:t>
+              <a:t>2024-07-12</a:t>
             </a:fld>
             <a:endParaRPr lang="en-SE"/>
           </a:p>
@@ -2763,7 +2977,7 @@
           <a:p>
             <a:fld id="{024B8AE9-66EA-4D6A-A8A7-9C9BEADD6B50}" type="datetimeFigureOut">
               <a:rPr lang="en-SE" smtClean="0"/>
-              <a:t>2024-02-01</a:t>
+              <a:t>2024-07-12</a:t>
             </a:fld>
             <a:endParaRPr lang="en-SE"/>
           </a:p>
@@ -3585,7 +3799,9 @@
             <a:avLst/>
           </a:prstGeom>
           <a:solidFill>
-            <a:srgbClr val="2C2C2C"/>
+            <a:srgbClr val="2C2C2C">
+              <a:alpha val="85000"/>
+            </a:srgbClr>
           </a:solidFill>
           <a:ln>
             <a:noFill/>
@@ -3637,7 +3853,9 @@
             <a:avLst/>
           </a:prstGeom>
           <a:solidFill>
-            <a:srgbClr val="2C2C2C"/>
+            <a:srgbClr val="2C2C2C">
+              <a:alpha val="85000"/>
+            </a:srgbClr>
           </a:solidFill>
           <a:ln>
             <a:noFill/>
@@ -3689,7 +3907,9 @@
             <a:avLst/>
           </a:prstGeom>
           <a:solidFill>
-            <a:srgbClr val="2C2C2C"/>
+            <a:srgbClr val="2C2C2C">
+              <a:alpha val="85000"/>
+            </a:srgbClr>
           </a:solidFill>
           <a:ln>
             <a:noFill/>
@@ -3741,7 +3961,9 @@
             <a:avLst/>
           </a:prstGeom>
           <a:solidFill>
-            <a:srgbClr val="2C2C2C"/>
+            <a:srgbClr val="2C2C2C">
+              <a:alpha val="85000"/>
+            </a:srgbClr>
           </a:solidFill>
           <a:ln>
             <a:noFill/>
@@ -3793,7 +4015,9 @@
             <a:avLst/>
           </a:prstGeom>
           <a:solidFill>
-            <a:srgbClr val="2C2C2C"/>
+            <a:srgbClr val="2C2C2C">
+              <a:alpha val="85000"/>
+            </a:srgbClr>
           </a:solidFill>
           <a:ln>
             <a:noFill/>
@@ -3845,7 +4069,9 @@
             <a:avLst/>
           </a:prstGeom>
           <a:solidFill>
-            <a:srgbClr val="2C2C2C"/>
+            <a:srgbClr val="2C2C2C">
+              <a:alpha val="85000"/>
+            </a:srgbClr>
           </a:solidFill>
           <a:ln>
             <a:noFill/>
@@ -3897,7 +4123,9 @@
             <a:avLst/>
           </a:prstGeom>
           <a:solidFill>
-            <a:srgbClr val="2C2C2C"/>
+            <a:srgbClr val="2C2C2C">
+              <a:alpha val="85000"/>
+            </a:srgbClr>
           </a:solidFill>
           <a:ln>
             <a:noFill/>
@@ -3949,7 +4177,9 @@
             <a:avLst/>
           </a:prstGeom>
           <a:solidFill>
-            <a:srgbClr val="2C2C2C"/>
+            <a:srgbClr val="2C2C2C">
+              <a:alpha val="85000"/>
+            </a:srgbClr>
           </a:solidFill>
           <a:ln>
             <a:noFill/>
@@ -4067,7 +4297,9 @@
             <a:avLst/>
           </a:prstGeom>
           <a:solidFill>
-            <a:srgbClr val="FFFFFF"/>
+            <a:srgbClr val="FFFFFF">
+              <a:alpha val="85000"/>
+            </a:srgbClr>
           </a:solidFill>
           <a:ln>
             <a:noFill/>
@@ -4119,7 +4351,9 @@
             <a:avLst/>
           </a:prstGeom>
           <a:solidFill>
-            <a:srgbClr val="FFFFFF"/>
+            <a:srgbClr val="FFFFFF">
+              <a:alpha val="85000"/>
+            </a:srgbClr>
           </a:solidFill>
           <a:ln>
             <a:noFill/>
@@ -4171,7 +4405,9 @@
             <a:avLst/>
           </a:prstGeom>
           <a:solidFill>
-            <a:srgbClr val="FFFFFF"/>
+            <a:srgbClr val="FFFFFF">
+              <a:alpha val="85000"/>
+            </a:srgbClr>
           </a:solidFill>
           <a:ln>
             <a:noFill/>
@@ -4223,7 +4459,9 @@
             <a:avLst/>
           </a:prstGeom>
           <a:solidFill>
-            <a:srgbClr val="FFFFFF"/>
+            <a:srgbClr val="FFFFFF">
+              <a:alpha val="85000"/>
+            </a:srgbClr>
           </a:solidFill>
           <a:ln>
             <a:noFill/>
@@ -4275,7 +4513,9 @@
             <a:avLst/>
           </a:prstGeom>
           <a:solidFill>
-            <a:srgbClr val="FFFFFF"/>
+            <a:srgbClr val="FFFFFF">
+              <a:alpha val="85000"/>
+            </a:srgbClr>
           </a:solidFill>
           <a:ln>
             <a:noFill/>
@@ -4327,7 +4567,9 @@
             <a:avLst/>
           </a:prstGeom>
           <a:solidFill>
-            <a:srgbClr val="FFFFFF"/>
+            <a:srgbClr val="FFFFFF">
+              <a:alpha val="85000"/>
+            </a:srgbClr>
           </a:solidFill>
           <a:ln>
             <a:noFill/>
@@ -4379,7 +4621,9 @@
             <a:avLst/>
           </a:prstGeom>
           <a:solidFill>
-            <a:srgbClr val="FFFFFF"/>
+            <a:srgbClr val="FFFFFF">
+              <a:alpha val="85000"/>
+            </a:srgbClr>
           </a:solidFill>
           <a:ln>
             <a:noFill/>
@@ -4431,7 +4675,9 @@
             <a:avLst/>
           </a:prstGeom>
           <a:solidFill>
-            <a:srgbClr val="FFFFFF"/>
+            <a:srgbClr val="FFFFFF">
+              <a:alpha val="85000"/>
+            </a:srgbClr>
           </a:solidFill>
           <a:ln>
             <a:noFill/>
@@ -4466,6 +4712,221 @@
     <p:extLst>
       <p:ext uri="{BB962C8B-B14F-4D97-AF65-F5344CB8AC3E}">
         <p14:creationId xmlns:p14="http://schemas.microsoft.com/office/powerpoint/2010/main" val="481644452"/>
+      </p:ext>
+    </p:extLst>
+  </p:cSld>
+  <p:clrMapOvr>
+    <a:masterClrMapping/>
+  </p:clrMapOvr>
+</p:sld>
+</file>
+
+<file path=ppt/slides/slide6.xml><?xml version="1.0" encoding="utf-8"?>
+<p:sld xmlns:a="http://schemas.openxmlformats.org/drawingml/2006/main" xmlns:r="http://schemas.openxmlformats.org/officeDocument/2006/relationships" xmlns:p="http://schemas.openxmlformats.org/presentationml/2006/main">
+  <p:cSld>
+    <p:spTree>
+      <p:nvGrpSpPr>
+        <p:cNvPr id="1" name=""/>
+        <p:cNvGrpSpPr/>
+        <p:nvPr/>
+      </p:nvGrpSpPr>
+      <p:grpSpPr>
+        <a:xfrm>
+          <a:off x="0" y="0"/>
+          <a:ext cx="0" cy="0"/>
+          <a:chOff x="0" y="0"/>
+          <a:chExt cx="0" cy="0"/>
+        </a:xfrm>
+      </p:grpSpPr>
+      <p:pic>
+        <p:nvPicPr>
+          <p:cNvPr id="3" name="Picture 2" descr="A blue house with a white tree&#10;&#10;Description automatically generated">
+            <a:extLst>
+              <a:ext uri="{FF2B5EF4-FFF2-40B4-BE49-F238E27FC236}">
+                <a16:creationId xmlns:a16="http://schemas.microsoft.com/office/drawing/2014/main" id="{E312AA82-1F8D-C027-4D29-5B552B800E69}"/>
+              </a:ext>
+            </a:extLst>
+          </p:cNvPr>
+          <p:cNvPicPr>
+            <a:picLocks noChangeAspect="1"/>
+          </p:cNvPicPr>
+          <p:nvPr/>
+        </p:nvPicPr>
+        <p:blipFill>
+          <a:blip r:embed="rId2">
+            <a:extLst>
+              <a:ext uri="{28A0092B-C50C-407E-A947-70E740481C1C}">
+                <a14:useLocalDpi xmlns:a14="http://schemas.microsoft.com/office/drawing/2010/main" val="0"/>
+              </a:ext>
+            </a:extLst>
+          </a:blip>
+          <a:stretch>
+            <a:fillRect/>
+          </a:stretch>
+        </p:blipFill>
+        <p:spPr>
+          <a:xfrm>
+            <a:off x="0" y="0"/>
+            <a:ext cx="4572000" cy="3048000"/>
+          </a:xfrm>
+          <a:prstGeom prst="rect">
+            <a:avLst/>
+          </a:prstGeom>
+        </p:spPr>
+      </p:pic>
+    </p:spTree>
+    <p:extLst>
+      <p:ext uri="{BB962C8B-B14F-4D97-AF65-F5344CB8AC3E}">
+        <p14:creationId xmlns:p14="http://schemas.microsoft.com/office/powerpoint/2010/main" val="2283762670"/>
+      </p:ext>
+    </p:extLst>
+  </p:cSld>
+  <p:clrMapOvr>
+    <a:masterClrMapping/>
+  </p:clrMapOvr>
+</p:sld>
+</file>
+
+<file path=ppt/slides/slide7.xml><?xml version="1.0" encoding="utf-8"?>
+<p:sld xmlns:a="http://schemas.openxmlformats.org/drawingml/2006/main" xmlns:r="http://schemas.openxmlformats.org/officeDocument/2006/relationships" xmlns:p="http://schemas.openxmlformats.org/presentationml/2006/main">
+  <p:cSld>
+    <p:bg>
+      <p:bgPr>
+        <a:solidFill>
+          <a:srgbClr val="4682B4"/>
+        </a:solidFill>
+        <a:effectLst/>
+      </p:bgPr>
+    </p:bg>
+    <p:spTree>
+      <p:nvGrpSpPr>
+        <p:cNvPr id="1" name=""/>
+        <p:cNvGrpSpPr/>
+        <p:nvPr/>
+      </p:nvGrpSpPr>
+      <p:grpSpPr>
+        <a:xfrm>
+          <a:off x="0" y="0"/>
+          <a:ext cx="0" cy="0"/>
+          <a:chOff x="0" y="0"/>
+          <a:chExt cx="0" cy="0"/>
+        </a:xfrm>
+      </p:grpSpPr>
+      <p:pic>
+        <p:nvPicPr>
+          <p:cNvPr id="5" name="Picture 4" descr="A black background with white letters&#10;&#10;Description automatically generated">
+            <a:extLst>
+              <a:ext uri="{FF2B5EF4-FFF2-40B4-BE49-F238E27FC236}">
+                <a16:creationId xmlns:a16="http://schemas.microsoft.com/office/drawing/2014/main" id="{0FE4C44D-F553-7411-C18E-ADB7E1F2F360}"/>
+              </a:ext>
+            </a:extLst>
+          </p:cNvPr>
+          <p:cNvPicPr>
+            <a:picLocks noChangeAspect="1"/>
+          </p:cNvPicPr>
+          <p:nvPr/>
+        </p:nvPicPr>
+        <p:blipFill>
+          <a:blip r:embed="rId2">
+            <a:extLst>
+              <a:ext uri="{28A0092B-C50C-407E-A947-70E740481C1C}">
+                <a14:useLocalDpi xmlns:a14="http://schemas.microsoft.com/office/drawing/2010/main" val="0"/>
+              </a:ext>
+            </a:extLst>
+          </a:blip>
+          <a:stretch>
+            <a:fillRect/>
+          </a:stretch>
+        </p:blipFill>
+        <p:spPr>
+          <a:xfrm>
+            <a:off x="84280" y="2680596"/>
+            <a:ext cx="1531302" cy="216000"/>
+          </a:xfrm>
+          <a:prstGeom prst="rect">
+            <a:avLst/>
+          </a:prstGeom>
+        </p:spPr>
+      </p:pic>
+      <p:pic>
+        <p:nvPicPr>
+          <p:cNvPr id="7" name="Graphic 6">
+            <a:extLst>
+              <a:ext uri="{FF2B5EF4-FFF2-40B4-BE49-F238E27FC236}">
+                <a16:creationId xmlns:a16="http://schemas.microsoft.com/office/drawing/2014/main" id="{AF95D14B-CD36-DE92-453B-928DD64988E7}"/>
+              </a:ext>
+            </a:extLst>
+          </p:cNvPr>
+          <p:cNvPicPr>
+            <a:picLocks noChangeAspect="1"/>
+          </p:cNvPicPr>
+          <p:nvPr/>
+        </p:nvPicPr>
+        <p:blipFill>
+          <a:blip r:embed="rId3">
+            <a:extLst>
+              <a:ext uri="{96DAC541-7B7A-43D3-8B79-37D633B846F1}">
+                <asvg:svgBlip xmlns:asvg="http://schemas.microsoft.com/office/drawing/2016/SVG/main" r:embed="rId4"/>
+              </a:ext>
+            </a:extLst>
+          </a:blip>
+          <a:stretch>
+            <a:fillRect/>
+          </a:stretch>
+        </p:blipFill>
+        <p:spPr>
+          <a:xfrm>
+            <a:off x="3385565" y="2680596"/>
+            <a:ext cx="1102155" cy="216000"/>
+          </a:xfrm>
+          <a:prstGeom prst="rect">
+            <a:avLst/>
+          </a:prstGeom>
+        </p:spPr>
+      </p:pic>
+      <p:sp>
+        <p:nvSpPr>
+          <p:cNvPr id="8" name="TextBox 7">
+            <a:extLst>
+              <a:ext uri="{FF2B5EF4-FFF2-40B4-BE49-F238E27FC236}">
+                <a16:creationId xmlns:a16="http://schemas.microsoft.com/office/drawing/2014/main" id="{1AB8D876-44F2-706C-70B9-1FC96772E454}"/>
+              </a:ext>
+            </a:extLst>
+          </p:cNvPr>
+          <p:cNvSpPr txBox="1"/>
+          <p:nvPr/>
+        </p:nvSpPr>
+        <p:spPr>
+          <a:xfrm>
+            <a:off x="84280" y="96917"/>
+            <a:ext cx="1311578" cy="369332"/>
+          </a:xfrm>
+          <a:prstGeom prst="rect">
+            <a:avLst/>
+          </a:prstGeom>
+          <a:noFill/>
+        </p:spPr>
+        <p:txBody>
+          <a:bodyPr wrap="none" rtlCol="0">
+            <a:spAutoFit/>
+          </a:bodyPr>
+          <a:lstStyle/>
+          <a:p>
+            <a:r>
+              <a:rPr lang="en-GB" dirty="0">
+                <a:solidFill>
+                  <a:srgbClr val="F2F4F9"/>
+                </a:solidFill>
+              </a:rPr>
+              <a:t>Initializing…</a:t>
+            </a:r>
+          </a:p>
+        </p:txBody>
+      </p:sp>
+    </p:spTree>
+    <p:extLst>
+      <p:ext uri="{BB962C8B-B14F-4D97-AF65-F5344CB8AC3E}">
+        <p14:creationId xmlns:p14="http://schemas.microsoft.com/office/powerpoint/2010/main" val="1111272298"/>
       </p:ext>
     </p:extLst>
   </p:cSld>

</xml_diff>